<commit_message>
modify DB ppt file
</commit_message>
<xml_diff>
--- a/Report/資料表關聯圖.pptx
+++ b/Report/資料表關聯圖.pptx
@@ -288,7 +288,7 @@
           <a:p>
             <a:fld id="{B2BC1FC4-848F-4DC2-819E-ACBAE656201B}" type="datetimeFigureOut">
               <a:rPr lang="zh-TW" altLang="en-US" smtClean="0"/>
-              <a:t>2014/12/22</a:t>
+              <a:t>2014/12/24</a:t>
             </a:fld>
             <a:endParaRPr lang="zh-TW" altLang="en-US"/>
           </a:p>
@@ -453,7 +453,7 @@
           <a:p>
             <a:fld id="{B2BC1FC4-848F-4DC2-819E-ACBAE656201B}" type="datetimeFigureOut">
               <a:rPr lang="zh-TW" altLang="en-US" smtClean="0"/>
-              <a:t>2014/12/22</a:t>
+              <a:t>2014/12/24</a:t>
             </a:fld>
             <a:endParaRPr lang="zh-TW" altLang="en-US"/>
           </a:p>
@@ -628,7 +628,7 @@
           <a:p>
             <a:fld id="{B2BC1FC4-848F-4DC2-819E-ACBAE656201B}" type="datetimeFigureOut">
               <a:rPr lang="zh-TW" altLang="en-US" smtClean="0"/>
-              <a:t>2014/12/22</a:t>
+              <a:t>2014/12/24</a:t>
             </a:fld>
             <a:endParaRPr lang="zh-TW" altLang="en-US"/>
           </a:p>
@@ -793,7 +793,7 @@
           <a:p>
             <a:fld id="{B2BC1FC4-848F-4DC2-819E-ACBAE656201B}" type="datetimeFigureOut">
               <a:rPr lang="zh-TW" altLang="en-US" smtClean="0"/>
-              <a:t>2014/12/22</a:t>
+              <a:t>2014/12/24</a:t>
             </a:fld>
             <a:endParaRPr lang="zh-TW" altLang="en-US"/>
           </a:p>
@@ -1034,7 +1034,7 @@
           <a:p>
             <a:fld id="{B2BC1FC4-848F-4DC2-819E-ACBAE656201B}" type="datetimeFigureOut">
               <a:rPr lang="zh-TW" altLang="en-US" smtClean="0"/>
-              <a:t>2014/12/22</a:t>
+              <a:t>2014/12/24</a:t>
             </a:fld>
             <a:endParaRPr lang="zh-TW" altLang="en-US"/>
           </a:p>
@@ -1317,7 +1317,7 @@
           <a:p>
             <a:fld id="{B2BC1FC4-848F-4DC2-819E-ACBAE656201B}" type="datetimeFigureOut">
               <a:rPr lang="zh-TW" altLang="en-US" smtClean="0"/>
-              <a:t>2014/12/22</a:t>
+              <a:t>2014/12/24</a:t>
             </a:fld>
             <a:endParaRPr lang="zh-TW" altLang="en-US"/>
           </a:p>
@@ -1734,7 +1734,7 @@
           <a:p>
             <a:fld id="{B2BC1FC4-848F-4DC2-819E-ACBAE656201B}" type="datetimeFigureOut">
               <a:rPr lang="zh-TW" altLang="en-US" smtClean="0"/>
-              <a:t>2014/12/22</a:t>
+              <a:t>2014/12/24</a:t>
             </a:fld>
             <a:endParaRPr lang="zh-TW" altLang="en-US"/>
           </a:p>
@@ -1847,7 +1847,7 @@
           <a:p>
             <a:fld id="{B2BC1FC4-848F-4DC2-819E-ACBAE656201B}" type="datetimeFigureOut">
               <a:rPr lang="zh-TW" altLang="en-US" smtClean="0"/>
-              <a:t>2014/12/22</a:t>
+              <a:t>2014/12/24</a:t>
             </a:fld>
             <a:endParaRPr lang="zh-TW" altLang="en-US"/>
           </a:p>
@@ -1937,7 +1937,7 @@
           <a:p>
             <a:fld id="{B2BC1FC4-848F-4DC2-819E-ACBAE656201B}" type="datetimeFigureOut">
               <a:rPr lang="zh-TW" altLang="en-US" smtClean="0"/>
-              <a:t>2014/12/22</a:t>
+              <a:t>2014/12/24</a:t>
             </a:fld>
             <a:endParaRPr lang="zh-TW" altLang="en-US"/>
           </a:p>
@@ -2209,7 +2209,7 @@
           <a:p>
             <a:fld id="{B2BC1FC4-848F-4DC2-819E-ACBAE656201B}" type="datetimeFigureOut">
               <a:rPr lang="zh-TW" altLang="en-US" smtClean="0"/>
-              <a:t>2014/12/22</a:t>
+              <a:t>2014/12/24</a:t>
             </a:fld>
             <a:endParaRPr lang="zh-TW" altLang="en-US"/>
           </a:p>
@@ -2457,7 +2457,7 @@
           <a:p>
             <a:fld id="{B2BC1FC4-848F-4DC2-819E-ACBAE656201B}" type="datetimeFigureOut">
               <a:rPr lang="zh-TW" altLang="en-US" smtClean="0"/>
-              <a:t>2014/12/22</a:t>
+              <a:t>2014/12/24</a:t>
             </a:fld>
             <a:endParaRPr lang="zh-TW" altLang="en-US"/>
           </a:p>
@@ -2665,7 +2665,7 @@
           <a:p>
             <a:fld id="{B2BC1FC4-848F-4DC2-819E-ACBAE656201B}" type="datetimeFigureOut">
               <a:rPr lang="zh-TW" altLang="en-US" smtClean="0"/>
-              <a:t>2014/12/22</a:t>
+              <a:t>2014/12/24</a:t>
             </a:fld>
             <a:endParaRPr lang="zh-TW" altLang="en-US"/>
           </a:p>
@@ -3035,6 +3035,60 @@
           <a:chExt cx="0" cy="0"/>
         </a:xfrm>
       </p:grpSpPr>
+      <p:sp>
+        <p:nvSpPr>
+          <p:cNvPr id="48" name="向右箭號 47"/>
+          <p:cNvSpPr/>
+          <p:nvPr/>
+        </p:nvSpPr>
+        <p:spPr>
+          <a:xfrm rot="7373169">
+            <a:off x="4850990" y="2428996"/>
+            <a:ext cx="2059213" cy="155774"/>
+          </a:xfrm>
+          <a:prstGeom prst="rightArrow">
+            <a:avLst/>
+          </a:prstGeom>
+          <a:solidFill>
+            <a:schemeClr val="accent6">
+              <a:lumMod val="40000"/>
+              <a:lumOff val="60000"/>
+            </a:schemeClr>
+          </a:solidFill>
+          <a:ln>
+            <a:solidFill>
+              <a:schemeClr val="accent6">
+                <a:lumMod val="40000"/>
+                <a:lumOff val="60000"/>
+              </a:schemeClr>
+            </a:solidFill>
+          </a:ln>
+        </p:spPr>
+        <p:style>
+          <a:lnRef idx="2">
+            <a:schemeClr val="accent1">
+              <a:shade val="50000"/>
+            </a:schemeClr>
+          </a:lnRef>
+          <a:fillRef idx="1">
+            <a:schemeClr val="accent1"/>
+          </a:fillRef>
+          <a:effectRef idx="0">
+            <a:schemeClr val="accent1"/>
+          </a:effectRef>
+          <a:fontRef idx="minor">
+            <a:schemeClr val="lt1"/>
+          </a:fontRef>
+        </p:style>
+        <p:txBody>
+          <a:bodyPr rtlCol="0" anchor="ctr"/>
+          <a:lstStyle/>
+          <a:p>
+            <a:pPr algn="ctr"/>
+            <a:endParaRPr lang="zh-TW" altLang="en-US"/>
+          </a:p>
+        </p:txBody>
+      </p:sp>
       <p:graphicFrame>
         <p:nvGraphicFramePr>
           <p:cNvPr id="21" name="表格 20"/>
@@ -7674,7 +7728,7 @@
                     <a:p>
                       <a:pPr algn="l" fontAlgn="ctr"/>
                       <a:r>
-                        <a:rPr lang="en-US" sz="1000" b="0" i="0" u="none" strike="noStrike">
+                        <a:rPr lang="en-US" sz="1000" b="0" i="0" u="none" strike="noStrike" dirty="0" err="1">
                           <a:solidFill>
                             <a:srgbClr val="000000"/>
                           </a:solidFill>
@@ -7682,6 +7736,12 @@
                         </a:rPr>
                         <a:t>int</a:t>
                       </a:r>
+                      <a:endParaRPr lang="en-US" sz="1000" b="0" i="0" u="none" strike="noStrike" dirty="0">
+                        <a:solidFill>
+                          <a:srgbClr val="000000"/>
+                        </a:solidFill>
+                        <a:latin typeface="新細明體"/>
+                      </a:endParaRPr>
                     </a:p>
                   </a:txBody>
                   <a:tcPr marL="9525" marR="9525" marT="9525" marB="0" anchor="ctr">
@@ -7974,10 +8034,16 @@
           <p:cNvGraphicFramePr>
             <a:graphicFrameLocks noGrp="1"/>
           </p:cNvGraphicFramePr>
-          <p:nvPr/>
+          <p:nvPr>
+            <p:extLst>
+              <p:ext uri="{D42A27DB-BD31-4B8C-83A1-F6EECF244321}">
+                <p14:modId xmlns:p14="http://schemas.microsoft.com/office/powerpoint/2010/main" val="1061893595"/>
+              </p:ext>
+            </p:extLst>
+          </p:nvPr>
         </p:nvGraphicFramePr>
         <p:xfrm>
-          <a:off x="2483768" y="5147270"/>
+          <a:off x="2339752" y="5147270"/>
           <a:ext cx="1689100" cy="1162050"/>
         </p:xfrm>
         <a:graphic>
@@ -11806,7 +11872,7 @@
         </p:nvSpPr>
         <p:spPr>
           <a:xfrm>
-            <a:off x="2339752" y="5733256"/>
+            <a:off x="2195736" y="5733256"/>
             <a:ext cx="1872208" cy="216024"/>
           </a:xfrm>
           <a:prstGeom prst="rect">
@@ -11902,7 +11968,7 @@
         </p:nvSpPr>
         <p:spPr>
           <a:xfrm>
-            <a:off x="251520" y="4221088"/>
+            <a:off x="222598" y="4221837"/>
             <a:ext cx="1872208" cy="216024"/>
           </a:xfrm>
           <a:prstGeom prst="rect">
@@ -11939,6 +12005,297 @@
           <a:p>
             <a:pPr algn="ctr"/>
             <a:endParaRPr lang="zh-TW" altLang="en-US" b="1" dirty="0"/>
+          </a:p>
+        </p:txBody>
+      </p:sp>
+      <p:sp>
+        <p:nvSpPr>
+          <p:cNvPr id="11" name="向右箭號 10"/>
+          <p:cNvSpPr/>
+          <p:nvPr/>
+        </p:nvSpPr>
+        <p:spPr>
+          <a:xfrm rot="7373169">
+            <a:off x="1664296" y="3112047"/>
+            <a:ext cx="2179686" cy="176192"/>
+          </a:xfrm>
+          <a:prstGeom prst="rightArrow">
+            <a:avLst/>
+          </a:prstGeom>
+          <a:solidFill>
+            <a:schemeClr val="accent6">
+              <a:lumMod val="50000"/>
+            </a:schemeClr>
+          </a:solidFill>
+          <a:ln>
+            <a:noFill/>
+          </a:ln>
+        </p:spPr>
+        <p:style>
+          <a:lnRef idx="2">
+            <a:schemeClr val="accent1">
+              <a:shade val="50000"/>
+            </a:schemeClr>
+          </a:lnRef>
+          <a:fillRef idx="1">
+            <a:schemeClr val="accent1"/>
+          </a:fillRef>
+          <a:effectRef idx="0">
+            <a:schemeClr val="accent1"/>
+          </a:effectRef>
+          <a:fontRef idx="minor">
+            <a:schemeClr val="lt1"/>
+          </a:fontRef>
+        </p:style>
+        <p:txBody>
+          <a:bodyPr rtlCol="0" anchor="ctr"/>
+          <a:lstStyle/>
+          <a:p>
+            <a:pPr algn="ctr"/>
+            <a:endParaRPr lang="zh-TW" altLang="en-US"/>
+          </a:p>
+        </p:txBody>
+      </p:sp>
+      <p:sp>
+        <p:nvSpPr>
+          <p:cNvPr id="36" name="向右箭號 35"/>
+          <p:cNvSpPr/>
+          <p:nvPr/>
+        </p:nvSpPr>
+        <p:spPr>
+          <a:xfrm rot="7373169">
+            <a:off x="1670899" y="4141649"/>
+            <a:ext cx="2066362" cy="155774"/>
+          </a:xfrm>
+          <a:prstGeom prst="rightArrow">
+            <a:avLst/>
+          </a:prstGeom>
+          <a:solidFill>
+            <a:schemeClr val="accent6">
+              <a:lumMod val="40000"/>
+              <a:lumOff val="60000"/>
+            </a:schemeClr>
+          </a:solidFill>
+          <a:ln>
+            <a:solidFill>
+              <a:schemeClr val="accent6">
+                <a:lumMod val="40000"/>
+                <a:lumOff val="60000"/>
+              </a:schemeClr>
+            </a:solidFill>
+          </a:ln>
+        </p:spPr>
+        <p:style>
+          <a:lnRef idx="2">
+            <a:schemeClr val="accent1">
+              <a:shade val="50000"/>
+            </a:schemeClr>
+          </a:lnRef>
+          <a:fillRef idx="1">
+            <a:schemeClr val="accent1"/>
+          </a:fillRef>
+          <a:effectRef idx="0">
+            <a:schemeClr val="accent1"/>
+          </a:effectRef>
+          <a:fontRef idx="minor">
+            <a:schemeClr val="lt1"/>
+          </a:fontRef>
+        </p:style>
+        <p:txBody>
+          <a:bodyPr rtlCol="0" anchor="ctr"/>
+          <a:lstStyle/>
+          <a:p>
+            <a:pPr algn="ctr"/>
+            <a:endParaRPr lang="zh-TW" altLang="en-US"/>
+          </a:p>
+        </p:txBody>
+      </p:sp>
+      <p:sp>
+        <p:nvSpPr>
+          <p:cNvPr id="37" name="向右箭號 36"/>
+          <p:cNvSpPr/>
+          <p:nvPr/>
+        </p:nvSpPr>
+        <p:spPr>
+          <a:xfrm rot="8584627">
+            <a:off x="1997656" y="1328989"/>
+            <a:ext cx="1417496" cy="180550"/>
+          </a:xfrm>
+          <a:prstGeom prst="rightArrow">
+            <a:avLst/>
+          </a:prstGeom>
+          <a:solidFill>
+            <a:srgbClr val="C00000"/>
+          </a:solidFill>
+          <a:ln>
+            <a:noFill/>
+          </a:ln>
+        </p:spPr>
+        <p:style>
+          <a:lnRef idx="2">
+            <a:schemeClr val="accent1">
+              <a:shade val="50000"/>
+            </a:schemeClr>
+          </a:lnRef>
+          <a:fillRef idx="1">
+            <a:schemeClr val="accent1"/>
+          </a:fillRef>
+          <a:effectRef idx="0">
+            <a:schemeClr val="accent1"/>
+          </a:effectRef>
+          <a:fontRef idx="minor">
+            <a:schemeClr val="lt1"/>
+          </a:fontRef>
+        </p:style>
+        <p:txBody>
+          <a:bodyPr rtlCol="0" anchor="ctr"/>
+          <a:lstStyle/>
+          <a:p>
+            <a:pPr algn="ctr"/>
+            <a:endParaRPr lang="zh-TW" altLang="en-US"/>
+          </a:p>
+        </p:txBody>
+      </p:sp>
+      <p:sp>
+        <p:nvSpPr>
+          <p:cNvPr id="47" name="向右箭號 46"/>
+          <p:cNvSpPr/>
+          <p:nvPr/>
+        </p:nvSpPr>
+        <p:spPr>
+          <a:xfrm rot="3921830">
+            <a:off x="4453383" y="2321438"/>
+            <a:ext cx="2893331" cy="169260"/>
+          </a:xfrm>
+          <a:prstGeom prst="rightArrow">
+            <a:avLst/>
+          </a:prstGeom>
+          <a:solidFill>
+            <a:srgbClr val="C00000"/>
+          </a:solidFill>
+          <a:ln>
+            <a:noFill/>
+          </a:ln>
+        </p:spPr>
+        <p:style>
+          <a:lnRef idx="2">
+            <a:schemeClr val="accent1">
+              <a:shade val="50000"/>
+            </a:schemeClr>
+          </a:lnRef>
+          <a:fillRef idx="1">
+            <a:schemeClr val="accent1"/>
+          </a:fillRef>
+          <a:effectRef idx="0">
+            <a:schemeClr val="accent1"/>
+          </a:effectRef>
+          <a:fontRef idx="minor">
+            <a:schemeClr val="lt1"/>
+          </a:fontRef>
+        </p:style>
+        <p:txBody>
+          <a:bodyPr rtlCol="0" anchor="ctr"/>
+          <a:lstStyle/>
+          <a:p>
+            <a:pPr algn="ctr"/>
+            <a:endParaRPr lang="zh-TW" altLang="en-US"/>
+          </a:p>
+        </p:txBody>
+      </p:sp>
+      <p:sp>
+        <p:nvSpPr>
+          <p:cNvPr id="49" name="向右箭號 48"/>
+          <p:cNvSpPr/>
+          <p:nvPr/>
+        </p:nvSpPr>
+        <p:spPr>
+          <a:xfrm rot="4849336">
+            <a:off x="3748148" y="4610036"/>
+            <a:ext cx="1632161" cy="158206"/>
+          </a:xfrm>
+          <a:prstGeom prst="rightArrow">
+            <a:avLst/>
+          </a:prstGeom>
+          <a:solidFill>
+            <a:schemeClr val="accent4">
+              <a:lumMod val="75000"/>
+              <a:alpha val="42000"/>
+            </a:schemeClr>
+          </a:solidFill>
+          <a:ln>
+            <a:noFill/>
+          </a:ln>
+        </p:spPr>
+        <p:style>
+          <a:lnRef idx="2">
+            <a:schemeClr val="accent1">
+              <a:shade val="50000"/>
+            </a:schemeClr>
+          </a:lnRef>
+          <a:fillRef idx="1">
+            <a:schemeClr val="accent1"/>
+          </a:fillRef>
+          <a:effectRef idx="0">
+            <a:schemeClr val="accent1"/>
+          </a:effectRef>
+          <a:fontRef idx="minor">
+            <a:schemeClr val="lt1"/>
+          </a:fontRef>
+        </p:style>
+        <p:txBody>
+          <a:bodyPr rtlCol="0" anchor="ctr"/>
+          <a:lstStyle/>
+          <a:p>
+            <a:pPr algn="ctr"/>
+            <a:endParaRPr lang="zh-TW" altLang="en-US"/>
+          </a:p>
+        </p:txBody>
+      </p:sp>
+      <p:sp>
+        <p:nvSpPr>
+          <p:cNvPr id="63" name="向右箭號 62"/>
+          <p:cNvSpPr/>
+          <p:nvPr/>
+        </p:nvSpPr>
+        <p:spPr>
+          <a:xfrm rot="6623594">
+            <a:off x="1119340" y="3956880"/>
+            <a:ext cx="3549665" cy="170648"/>
+          </a:xfrm>
+          <a:prstGeom prst="rightArrow">
+            <a:avLst/>
+          </a:prstGeom>
+          <a:solidFill>
+            <a:schemeClr val="accent6">
+              <a:lumMod val="50000"/>
+            </a:schemeClr>
+          </a:solidFill>
+          <a:ln>
+            <a:noFill/>
+          </a:ln>
+        </p:spPr>
+        <p:style>
+          <a:lnRef idx="2">
+            <a:schemeClr val="accent1">
+              <a:shade val="50000"/>
+            </a:schemeClr>
+          </a:lnRef>
+          <a:fillRef idx="1">
+            <a:schemeClr val="accent1"/>
+          </a:fillRef>
+          <a:effectRef idx="0">
+            <a:schemeClr val="accent1"/>
+          </a:effectRef>
+          <a:fontRef idx="minor">
+            <a:schemeClr val="lt1"/>
+          </a:fontRef>
+        </p:style>
+        <p:txBody>
+          <a:bodyPr rtlCol="0" anchor="ctr"/>
+          <a:lstStyle/>
+          <a:p>
+            <a:pPr algn="ctr"/>
+            <a:endParaRPr lang="zh-TW" altLang="en-US"/>
           </a:p>
         </p:txBody>
       </p:sp>

</xml_diff>